<commit_message>
Added IMPLEMENTATION.md file to outline the bullet point / numbered list implementation steps.
</commit_message>
<xml_diff>
--- a/src/bullet_style_demo.pptx
+++ b/src/bullet_style_demo.pptx
@@ -3114,7 +3114,7 @@
               <a:defRPr sz="1400"/>
             </a:pPr>
             <a:r>
-              <a:t>This is a paragraph without any bullet style (default) This is a paragraph without any bullet style (default)This is a paragraph without any bullet style (default)This is a paragraph without any bullet style (default)This is a paragraph without any bullet style (default)This is a paragraph without any bullet style (default)This is a paragraph without any bullet style (default)This is a paragraph without any bullet style (default)This is a paragraph without any bullet style (default)This is a paragraph without any bullet style (default)</a:t>
+              <a:t>This is a paragraph without any bullet style (default) This is a paragraph without any bullet style (default)</a:t>
             </a:r>
           </a:p>
           <a:p>
@@ -3166,15 +3166,11 @@
             </a:r>
           </a:p>
           <a:p>
-            <a:pPr lvl="1" marL="457200" indent="-457200">
-              <a:spcBef>
-                <a:spcPts val="600"/>
-              </a:spcBef>
-              <a:buChar char="•"/>
-              <a:defRPr sz="1200"/>
+            <a:pPr>
+              <a:defRPr sz="1400"/>
             </a:pPr>
             <a:r>
-              <a:t>Indented sub-item</a:t>
+              <a:t>This is a paragraph without any bullet style (default) This is a paragraph without any bullet style (default)</a:t>
             </a:r>
           </a:p>
         </p:txBody>

</xml_diff>

<commit_message>
Added level-based indentation that scales with paragraph level.
</commit_message>
<xml_diff>
--- a/src/bullet_style_demo.pptx
+++ b/src/bullet_style_demo.pptx
@@ -3142,6 +3142,18 @@
             </a:r>
           </a:p>
           <a:p>
+            <a:pPr lvl="2" marL="1371600" indent="-457200">
+              <a:spcBef>
+                <a:spcPts val="600"/>
+              </a:spcBef>
+              <a:buChar char="•"/>
+              <a:defRPr sz="1400"/>
+            </a:pPr>
+            <a:r>
+              <a:t>INDENTED cost breakdown by department This is a paragraph without any bullet style (default) This is a paragraph without any bullet style (default) This is a paragraph without any bullet style (default) This is a paragraph without any bullet style (default) This is a paragraph without any bullet style (default) This is a paragraph without any bullet style (default) This is a paragraph without any bullet style (default) This is a paragraph without any bullet style (default) This is a paragraph without any bullet style (default) This is a paragraph without any bullet style (default)</a:t>
+            </a:r>
+          </a:p>
+          <a:p>
             <a:pPr marL="457200" indent="-457200">
               <a:spcBef>
                 <a:spcPts val="600"/>
@@ -3166,11 +3178,47 @@
             </a:r>
           </a:p>
           <a:p>
+            <a:pPr lvl="1" marL="914400" indent="-457200">
+              <a:spcBef>
+                <a:spcPts val="400"/>
+              </a:spcBef>
+              <a:buChar char="•"/>
+              <a:defRPr sz="1200"/>
+            </a:pPr>
+            <a:r>
+              <a:t>Level 1 sub-item - notice increased indentation</a:t>
+            </a:r>
+          </a:p>
+          <a:p>
+            <a:pPr lvl="2" marL="1371600" indent="-457200">
+              <a:spcBef>
+                <a:spcPts val="400"/>
+              </a:spcBef>
+              <a:buChar char="•"/>
+              <a:defRPr sz="1100"/>
+            </a:pPr>
+            <a:r>
+              <a:t>Level 2 sub-item - even more indentation</a:t>
+            </a:r>
+          </a:p>
+          <a:p>
+            <a:pPr marL="457200" indent="-457200">
+              <a:spcBef>
+                <a:spcPts val="600"/>
+              </a:spcBef>
+              <a:buChar char="•"/>
+              <a:defRPr sz="1400"/>
+            </a:pPr>
+            <a:r>
+              <a:t>Back to level 0 bullet</a:t>
+            </a:r>
+          </a:p>
+          <a:p>
             <a:pPr>
               <a:defRPr sz="1400"/>
             </a:pPr>
             <a:r>
-              <a:t>This is a paragraph without any bullet style (default) This is a paragraph without any bullet style (default)</a:t>
+              <a:t>This is a paragraph without any bullet style (default)</a:t>
             </a:r>
           </a:p>
         </p:txBody>

</xml_diff>

<commit_message>
Replaced the content of README. Also, implemented unit test, integration test, and demo test code.
</commit_message>
<xml_diff>
--- a/src/bullet_style_demo.pptx
+++ b/src/bullet_style_demo.pptx
@@ -3111,103 +3111,103 @@
           <a:lstStyle/>
           <a:p>
             <a:pPr>
-              <a:defRPr sz="1400"/>
+              <a:defRPr sz="700"/>
             </a:pPr>
             <a:r>
               <a:t>This is a paragraph without any bullet style (default) This is a paragraph without any bullet style (default)</a:t>
             </a:r>
           </a:p>
           <a:p>
-            <a:pPr marL="457200" indent="-457200">
+            <a:pPr marL="228600" indent="-228600">
               <a:spcBef>
-                <a:spcPts val="600"/>
+                <a:spcPts val="300"/>
               </a:spcBef>
               <a:buChar char="•"/>
-              <a:defRPr sz="1400"/>
+              <a:defRPr sz="700"/>
             </a:pPr>
             <a:r>
               <a:t>$XXk annual software spend, split by XX per segment This is a paragraph without any bullet style (default) This is a paragraph without any bu This is a paragraph without any bullet style (default) This is a paragraph without any bullet style (default)llet style (default) This is a paragraph without any bullet style (default)</a:t>
             </a:r>
           </a:p>
           <a:p>
-            <a:pPr marL="457200" indent="-457200">
+            <a:pPr marL="228600" indent="-228600">
               <a:spcBef>
-                <a:spcPts val="600"/>
+                <a:spcPts val="300"/>
               </a:spcBef>
               <a:buChar char="•"/>
-              <a:defRPr sz="1400"/>
+              <a:defRPr sz="700"/>
             </a:pPr>
             <a:r>
               <a:t>Cost breakdown by department This is a paragraph without any bullet style (default) This is a paragraph without any bullet style (default) This is a paragraph without any bullet style (default) This is a paragraph without any bullet style (default) This is a paragraph without any bullet style (default) This is a paragraph without any bullet style (default) This is a paragraph without any bullet style (default) This is a paragraph without any bullet style (default) This is a paragraph without any bullet style (default) This is a paragraph without any bullet style (default)</a:t>
             </a:r>
           </a:p>
           <a:p>
-            <a:pPr lvl="2" marL="1371600" indent="-457200">
+            <a:pPr lvl="2" marL="685800" indent="-228600">
               <a:spcBef>
-                <a:spcPts val="600"/>
+                <a:spcPts val="300"/>
               </a:spcBef>
               <a:buChar char="•"/>
-              <a:defRPr sz="1400"/>
+              <a:defRPr sz="700"/>
             </a:pPr>
             <a:r>
               <a:t>INDENTED cost breakdown by department This is a paragraph without any bullet style (default) This is a paragraph without any bullet style (default) This is a paragraph without any bullet style (default) This is a paragraph without any bullet style (default) This is a paragraph without any bullet style (default) This is a paragraph without any bullet style (default) This is a paragraph without any bullet style (default) This is a paragraph without any bullet style (default) This is a paragraph without any bullet style (default) This is a paragraph without any bullet style (default)</a:t>
             </a:r>
           </a:p>
           <a:p>
-            <a:pPr marL="457200" indent="-457200">
+            <a:pPr marL="228600" indent="-228600">
               <a:spcBef>
-                <a:spcPts val="600"/>
+                <a:spcPts val="300"/>
               </a:spcBef>
               <a:buAutoNum type="arabicPeriod"/>
-              <a:defRPr sz="1400"/>
+              <a:defRPr sz="700"/>
             </a:pPr>
             <a:r>
               <a:t>First action item This is a paragraph without any bullet style (default) This is a paragraph without any bullet style (default) This is a paragraph without any bullet style (default) This is a paragraph without any bullet style (default) This is a paragraph without any bullet style (default) This is a paragraph without any bullet style (default) This is a paragraph without any bullet style (default) This is a paragraph without any bullet style (default) This is a paragraph without any bullet style (default) This is a paragraph without any bullet style (default)</a:t>
             </a:r>
           </a:p>
           <a:p>
-            <a:pPr marL="457200" indent="-457200">
+            <a:pPr marL="228600" indent="-228600">
               <a:spcBef>
-                <a:spcPts val="600"/>
+                <a:spcPts val="300"/>
               </a:spcBef>
               <a:buAutoNum type="arabicPeriod"/>
-              <a:defRPr sz="1400"/>
+              <a:defRPr sz="700"/>
             </a:pPr>
             <a:r>
               <a:t>Second action item</a:t>
             </a:r>
           </a:p>
           <a:p>
-            <a:pPr lvl="1" marL="914400" indent="-457200">
+            <a:pPr lvl="1" marL="457200" indent="-228600">
               <a:spcBef>
-                <a:spcPts val="400"/>
+                <a:spcPts val="300"/>
               </a:spcBef>
               <a:buChar char="•"/>
-              <a:defRPr sz="1200"/>
+              <a:defRPr sz="700"/>
             </a:pPr>
             <a:r>
               <a:t>Level 1 sub-item - notice increased indentation</a:t>
             </a:r>
           </a:p>
           <a:p>
-            <a:pPr lvl="2" marL="1371600" indent="-457200">
+            <a:pPr lvl="2" marL="685800" indent="-228600">
               <a:spcBef>
-                <a:spcPts val="400"/>
+                <a:spcPts val="300"/>
               </a:spcBef>
               <a:buChar char="•"/>
-              <a:defRPr sz="1100"/>
+              <a:defRPr sz="700"/>
             </a:pPr>
             <a:r>
               <a:t>Level 2 sub-item - even more indentation</a:t>
             </a:r>
           </a:p>
           <a:p>
-            <a:pPr marL="457200" indent="-457200">
+            <a:pPr marL="228600" indent="-228600">
               <a:spcBef>
-                <a:spcPts val="600"/>
+                <a:spcPts val="300"/>
               </a:spcBef>
               <a:buChar char="•"/>
-              <a:defRPr sz="1400"/>
+              <a:defRPr sz="700"/>
             </a:pPr>
             <a:r>
               <a:t>Back to level 0 bullet</a:t>
@@ -3215,7 +3215,7 @@
           </a:p>
           <a:p>
             <a:pPr>
-              <a:defRPr sz="1400"/>
+              <a:defRPr sz="700"/>
             </a:pPr>
             <a:r>
               <a:t>This is a paragraph without any bullet style (default)</a:t>

</xml_diff>